<commit_message>
null models updated 2
</commit_message>
<xml_diff>
--- a/Practical_classes/Null_models/null_models.pptx
+++ b/Practical_classes/Null_models/null_models.pptx
@@ -122,6 +122,11 @@
     <p:ext uri="{EFAFB233-063F-42B5-8137-9DF3F51BA10A}">
       <p15:sldGuideLst xmlns:p15="http://schemas.microsoft.com/office/powerpoint/2012/main">
         <p15:guide id="2" pos="483" userDrawn="1">
+          <p15:clr>
+            <a:srgbClr val="A4A3A4"/>
+          </p15:clr>
+        </p15:guide>
+        <p15:guide id="3" orient="horz" pos="2160">
           <p15:clr>
             <a:srgbClr val="A4A3A4"/>
           </p15:clr>

</xml_diff>